<commit_message>
Update and add some ppts
</commit_message>
<xml_diff>
--- a/因你與我同行.pptx
+++ b/因你與我同行.pptx
@@ -7,12 +7,10 @@
   <p:sldIdLst>
     <p:sldId id="256" r:id="rId2"/>
     <p:sldId id="257" r:id="rId3"/>
-    <p:sldId id="258" r:id="rId4"/>
-    <p:sldId id="259" r:id="rId5"/>
-    <p:sldId id="260" r:id="rId6"/>
-    <p:sldId id="261" r:id="rId7"/>
+    <p:sldId id="259" r:id="rId4"/>
+    <p:sldId id="260" r:id="rId5"/>
   </p:sldIdLst>
-  <p:sldSz cx="9144000" cy="6858000" type="screen4x3"/>
+  <p:sldSz cx="12192000" cy="6858000"/>
   <p:notesSz cx="6858000" cy="9144000"/>
   <p:defaultTextStyle>
     <a:defPPr>
@@ -109,6 +107,22 @@
       </a:defRPr>
     </a:lvl9pPr>
   </p:defaultTextStyle>
+  <p:extLst>
+    <p:ext uri="{EFAFB233-063F-42B5-8137-9DF3F51BA10A}">
+      <p15:sldGuideLst xmlns:p15="http://schemas.microsoft.com/office/powerpoint/2012/main">
+        <p15:guide id="1" orient="horz" pos="2160" userDrawn="1">
+          <p15:clr>
+            <a:srgbClr val="A4A3A4"/>
+          </p15:clr>
+        </p15:guide>
+        <p15:guide id="2" pos="3840" userDrawn="1">
+          <p15:clr>
+            <a:srgbClr val="A4A3A4"/>
+          </p15:clr>
+        </p15:guide>
+      </p15:sldGuideLst>
+    </p:ext>
+  </p:extLst>
 </p:presentation>
 </file>
 
@@ -141,8 +155,8 @@
         </p:nvSpPr>
         <p:spPr>
           <a:xfrm>
-            <a:off x="685800" y="2130425"/>
-            <a:ext cx="7772400" cy="1470025"/>
+            <a:off x="914400" y="2130426"/>
+            <a:ext cx="10363200" cy="1470025"/>
           </a:xfrm>
         </p:spPr>
         <p:txBody>
@@ -169,8 +183,8 @@
         </p:nvSpPr>
         <p:spPr>
           <a:xfrm>
-            <a:off x="1371600" y="3886200"/>
-            <a:ext cx="6400800" cy="1752600"/>
+            <a:off x="1828800" y="3886200"/>
+            <a:ext cx="8534400" cy="1752600"/>
           </a:xfrm>
         </p:spPr>
         <p:txBody>
@@ -294,7 +308,7 @@
             <a:fld id="{E8012960-2DAD-49C9-916B-8F1B19774F39}" type="datetimeFigureOut">
               <a:rPr lang="zh-TW" altLang="en-US" smtClean="0"/>
               <a:pPr/>
-              <a:t>2017/9/24</a:t>
+              <a:t>2020/7/18</a:t>
             </a:fld>
             <a:endParaRPr lang="zh-TW" altLang="en-US"/>
           </a:p>
@@ -461,7 +475,7 @@
             <a:fld id="{E8012960-2DAD-49C9-916B-8F1B19774F39}" type="datetimeFigureOut">
               <a:rPr lang="zh-TW" altLang="en-US" smtClean="0"/>
               <a:pPr/>
-              <a:t>2017/9/24</a:t>
+              <a:t>2020/7/18</a:t>
             </a:fld>
             <a:endParaRPr lang="zh-TW" altLang="en-US"/>
           </a:p>
@@ -547,8 +561,8 @@
         </p:nvSpPr>
         <p:spPr>
           <a:xfrm>
-            <a:off x="6629400" y="274638"/>
-            <a:ext cx="2057400" cy="5851525"/>
+            <a:off x="8839200" y="274639"/>
+            <a:ext cx="2743200" cy="5851525"/>
           </a:xfrm>
         </p:spPr>
         <p:txBody>
@@ -575,8 +589,8 @@
         </p:nvSpPr>
         <p:spPr>
           <a:xfrm>
-            <a:off x="457200" y="274638"/>
-            <a:ext cx="6019800" cy="5851525"/>
+            <a:off x="609600" y="274639"/>
+            <a:ext cx="8026400" cy="5851525"/>
           </a:xfrm>
         </p:spPr>
         <p:txBody>
@@ -638,7 +652,7 @@
             <a:fld id="{E8012960-2DAD-49C9-916B-8F1B19774F39}" type="datetimeFigureOut">
               <a:rPr lang="zh-TW" altLang="en-US" smtClean="0"/>
               <a:pPr/>
-              <a:t>2017/9/24</a:t>
+              <a:t>2020/7/18</a:t>
             </a:fld>
             <a:endParaRPr lang="zh-TW" altLang="en-US"/>
           </a:p>
@@ -805,7 +819,7 @@
             <a:fld id="{E8012960-2DAD-49C9-916B-8F1B19774F39}" type="datetimeFigureOut">
               <a:rPr lang="zh-TW" altLang="en-US" smtClean="0"/>
               <a:pPr/>
-              <a:t>2017/9/24</a:t>
+              <a:t>2020/7/18</a:t>
             </a:fld>
             <a:endParaRPr lang="zh-TW" altLang="en-US"/>
           </a:p>
@@ -891,8 +905,8 @@
         </p:nvSpPr>
         <p:spPr>
           <a:xfrm>
-            <a:off x="722313" y="4406900"/>
-            <a:ext cx="7772400" cy="1362075"/>
+            <a:off x="963084" y="4406901"/>
+            <a:ext cx="10363200" cy="1362075"/>
           </a:xfrm>
         </p:spPr>
         <p:txBody>
@@ -923,8 +937,8 @@
         </p:nvSpPr>
         <p:spPr>
           <a:xfrm>
-            <a:off x="722313" y="2906713"/>
-            <a:ext cx="7772400" cy="1500187"/>
+            <a:off x="963084" y="2906713"/>
+            <a:ext cx="10363200" cy="1500187"/>
           </a:xfrm>
         </p:spPr>
         <p:txBody>
@@ -1048,7 +1062,7 @@
             <a:fld id="{E8012960-2DAD-49C9-916B-8F1B19774F39}" type="datetimeFigureOut">
               <a:rPr lang="zh-TW" altLang="en-US" smtClean="0"/>
               <a:pPr/>
-              <a:t>2017/9/24</a:t>
+              <a:t>2020/7/18</a:t>
             </a:fld>
             <a:endParaRPr lang="zh-TW" altLang="en-US"/>
           </a:p>
@@ -1157,8 +1171,8 @@
         </p:nvSpPr>
         <p:spPr>
           <a:xfrm>
-            <a:off x="457200" y="1600200"/>
-            <a:ext cx="4038600" cy="4525963"/>
+            <a:off x="609600" y="1600201"/>
+            <a:ext cx="5384800" cy="4525963"/>
           </a:xfrm>
         </p:spPr>
         <p:txBody>
@@ -1242,8 +1256,8 @@
         </p:nvSpPr>
         <p:spPr>
           <a:xfrm>
-            <a:off x="4648200" y="1600200"/>
-            <a:ext cx="4038600" cy="4525963"/>
+            <a:off x="6197600" y="1600201"/>
+            <a:ext cx="5384800" cy="4525963"/>
           </a:xfrm>
         </p:spPr>
         <p:txBody>
@@ -1333,7 +1347,7 @@
             <a:fld id="{E8012960-2DAD-49C9-916B-8F1B19774F39}" type="datetimeFigureOut">
               <a:rPr lang="zh-TW" altLang="en-US" smtClean="0"/>
               <a:pPr/>
-              <a:t>2017/9/24</a:t>
+              <a:t>2020/7/18</a:t>
             </a:fld>
             <a:endParaRPr lang="zh-TW" altLang="en-US"/>
           </a:p>
@@ -1446,8 +1460,8 @@
         </p:nvSpPr>
         <p:spPr>
           <a:xfrm>
-            <a:off x="457200" y="1535113"/>
-            <a:ext cx="4040188" cy="639762"/>
+            <a:off x="609600" y="1535113"/>
+            <a:ext cx="5386917" cy="639762"/>
           </a:xfrm>
         </p:spPr>
         <p:txBody>
@@ -1511,8 +1525,8 @@
         </p:nvSpPr>
         <p:spPr>
           <a:xfrm>
-            <a:off x="457200" y="2174875"/>
-            <a:ext cx="4040188" cy="3951288"/>
+            <a:off x="609600" y="2174875"/>
+            <a:ext cx="5386917" cy="3951288"/>
           </a:xfrm>
         </p:spPr>
         <p:txBody>
@@ -1596,8 +1610,8 @@
         </p:nvSpPr>
         <p:spPr>
           <a:xfrm>
-            <a:off x="4645025" y="1535113"/>
-            <a:ext cx="4041775" cy="639762"/>
+            <a:off x="6193368" y="1535113"/>
+            <a:ext cx="5389033" cy="639762"/>
           </a:xfrm>
         </p:spPr>
         <p:txBody>
@@ -1661,8 +1675,8 @@
         </p:nvSpPr>
         <p:spPr>
           <a:xfrm>
-            <a:off x="4645025" y="2174875"/>
-            <a:ext cx="4041775" cy="3951288"/>
+            <a:off x="6193368" y="2174875"/>
+            <a:ext cx="5389033" cy="3951288"/>
           </a:xfrm>
         </p:spPr>
         <p:txBody>
@@ -1752,7 +1766,7 @@
             <a:fld id="{E8012960-2DAD-49C9-916B-8F1B19774F39}" type="datetimeFigureOut">
               <a:rPr lang="zh-TW" altLang="en-US" smtClean="0"/>
               <a:pPr/>
-              <a:t>2017/9/24</a:t>
+              <a:t>2020/7/18</a:t>
             </a:fld>
             <a:endParaRPr lang="zh-TW" altLang="en-US"/>
           </a:p>
@@ -1867,7 +1881,7 @@
             <a:fld id="{E8012960-2DAD-49C9-916B-8F1B19774F39}" type="datetimeFigureOut">
               <a:rPr lang="zh-TW" altLang="en-US" smtClean="0"/>
               <a:pPr/>
-              <a:t>2017/9/24</a:t>
+              <a:t>2020/7/18</a:t>
             </a:fld>
             <a:endParaRPr lang="zh-TW" altLang="en-US"/>
           </a:p>
@@ -1959,7 +1973,7 @@
             <a:fld id="{E8012960-2DAD-49C9-916B-8F1B19774F39}" type="datetimeFigureOut">
               <a:rPr lang="zh-TW" altLang="en-US" smtClean="0"/>
               <a:pPr/>
-              <a:t>2017/9/24</a:t>
+              <a:t>2020/7/18</a:t>
             </a:fld>
             <a:endParaRPr lang="zh-TW" altLang="en-US"/>
           </a:p>
@@ -2045,8 +2059,8 @@
         </p:nvSpPr>
         <p:spPr>
           <a:xfrm>
-            <a:off x="457200" y="273050"/>
-            <a:ext cx="3008313" cy="1162050"/>
+            <a:off x="609601" y="273050"/>
+            <a:ext cx="4011084" cy="1162050"/>
           </a:xfrm>
         </p:spPr>
         <p:txBody>
@@ -2077,8 +2091,8 @@
         </p:nvSpPr>
         <p:spPr>
           <a:xfrm>
-            <a:off x="3575050" y="273050"/>
-            <a:ext cx="5111750" cy="5853113"/>
+            <a:off x="4766733" y="273051"/>
+            <a:ext cx="6815667" cy="5853113"/>
           </a:xfrm>
         </p:spPr>
         <p:txBody>
@@ -2162,8 +2176,8 @@
         </p:nvSpPr>
         <p:spPr>
           <a:xfrm>
-            <a:off x="457200" y="1435100"/>
-            <a:ext cx="3008313" cy="4691063"/>
+            <a:off x="609601" y="1435101"/>
+            <a:ext cx="4011084" cy="4691063"/>
           </a:xfrm>
         </p:spPr>
         <p:txBody>
@@ -2233,7 +2247,7 @@
             <a:fld id="{E8012960-2DAD-49C9-916B-8F1B19774F39}" type="datetimeFigureOut">
               <a:rPr lang="zh-TW" altLang="en-US" smtClean="0"/>
               <a:pPr/>
-              <a:t>2017/9/24</a:t>
+              <a:t>2020/7/18</a:t>
             </a:fld>
             <a:endParaRPr lang="zh-TW" altLang="en-US"/>
           </a:p>
@@ -2319,8 +2333,8 @@
         </p:nvSpPr>
         <p:spPr>
           <a:xfrm>
-            <a:off x="1792288" y="4800600"/>
-            <a:ext cx="5486400" cy="566738"/>
+            <a:off x="2389717" y="4800600"/>
+            <a:ext cx="7315200" cy="566738"/>
           </a:xfrm>
         </p:spPr>
         <p:txBody>
@@ -2351,8 +2365,8 @@
         </p:nvSpPr>
         <p:spPr>
           <a:xfrm>
-            <a:off x="1792288" y="612775"/>
-            <a:ext cx="5486400" cy="4114800"/>
+            <a:off x="2389717" y="612775"/>
+            <a:ext cx="7315200" cy="4114800"/>
           </a:xfrm>
         </p:spPr>
         <p:txBody>
@@ -2416,8 +2430,8 @@
         </p:nvSpPr>
         <p:spPr>
           <a:xfrm>
-            <a:off x="1792288" y="5367338"/>
-            <a:ext cx="5486400" cy="804862"/>
+            <a:off x="2389717" y="5367338"/>
+            <a:ext cx="7315200" cy="804862"/>
           </a:xfrm>
         </p:spPr>
         <p:txBody>
@@ -2487,7 +2501,7 @@
             <a:fld id="{E8012960-2DAD-49C9-916B-8F1B19774F39}" type="datetimeFigureOut">
               <a:rPr lang="zh-TW" altLang="en-US" smtClean="0"/>
               <a:pPr/>
-              <a:t>2017/9/24</a:t>
+              <a:t>2020/7/18</a:t>
             </a:fld>
             <a:endParaRPr lang="zh-TW" altLang="en-US"/>
           </a:p>
@@ -2583,8 +2597,8 @@
         </p:nvSpPr>
         <p:spPr>
           <a:xfrm>
-            <a:off x="457200" y="274638"/>
-            <a:ext cx="8229600" cy="1143000"/>
+            <a:off x="609600" y="274638"/>
+            <a:ext cx="10972800" cy="1143000"/>
           </a:xfrm>
           <a:prstGeom prst="rect">
             <a:avLst/>
@@ -2616,8 +2630,8 @@
         </p:nvSpPr>
         <p:spPr>
           <a:xfrm>
-            <a:off x="457200" y="1600200"/>
-            <a:ext cx="8229600" cy="4525963"/>
+            <a:off x="609600" y="1600201"/>
+            <a:ext cx="10972800" cy="4525963"/>
           </a:xfrm>
           <a:prstGeom prst="rect">
             <a:avLst/>
@@ -2678,8 +2692,8 @@
         </p:nvSpPr>
         <p:spPr>
           <a:xfrm>
-            <a:off x="457200" y="6356350"/>
-            <a:ext cx="2133600" cy="365125"/>
+            <a:off x="609600" y="6356351"/>
+            <a:ext cx="2844800" cy="365125"/>
           </a:xfrm>
           <a:prstGeom prst="rect">
             <a:avLst/>
@@ -2702,7 +2716,7 @@
             <a:fld id="{E8012960-2DAD-49C9-916B-8F1B19774F39}" type="datetimeFigureOut">
               <a:rPr lang="zh-TW" altLang="en-US" smtClean="0"/>
               <a:pPr/>
-              <a:t>2017/9/24</a:t>
+              <a:t>2020/7/18</a:t>
             </a:fld>
             <a:endParaRPr lang="zh-TW" altLang="en-US"/>
           </a:p>
@@ -2720,8 +2734,8 @@
         </p:nvSpPr>
         <p:spPr>
           <a:xfrm>
-            <a:off x="3124200" y="6356350"/>
-            <a:ext cx="2895600" cy="365125"/>
+            <a:off x="4165600" y="6356351"/>
+            <a:ext cx="3860800" cy="365125"/>
           </a:xfrm>
           <a:prstGeom prst="rect">
             <a:avLst/>
@@ -2757,8 +2771,8 @@
         </p:nvSpPr>
         <p:spPr>
           <a:xfrm>
-            <a:off x="6553200" y="6356350"/>
-            <a:ext cx="2133600" cy="365125"/>
+            <a:off x="8737600" y="6356351"/>
+            <a:ext cx="2844800" cy="365125"/>
           </a:xfrm>
           <a:prstGeom prst="rect">
             <a:avLst/>
@@ -3091,16 +3105,46 @@
           <a:lstStyle/>
           <a:p>
             <a:r>
-              <a:rPr lang="zh-TW" altLang="en-US" b="1" dirty="0" smtClean="0">
-                <a:solidFill>
-                  <a:srgbClr val="000066"/>
-                </a:solidFill>
-                <a:latin typeface="微軟正黑體" pitchFamily="34" charset="-120"/>
-                <a:ea typeface="微軟正黑體" pitchFamily="34" charset="-120"/>
-              </a:rPr>
-              <a:t>因你與我同行</a:t>
-            </a:r>
-            <a:endParaRPr lang="zh-TW" altLang="en-US" b="1" dirty="0">
+              <a:rPr lang="zh-TW" altLang="en-US" sz="4800" b="1" dirty="0" smtClean="0">
+                <a:solidFill>
+                  <a:srgbClr val="000066"/>
+                </a:solidFill>
+                <a:latin typeface="微軟正黑體" pitchFamily="34" charset="-120"/>
+                <a:ea typeface="微軟正黑體" pitchFamily="34" charset="-120"/>
+              </a:rPr>
+              <a:t>因</a:t>
+            </a:r>
+            <a:r>
+              <a:rPr lang="zh-CN" altLang="en-US" sz="4800" b="1" dirty="0" smtClean="0">
+                <a:solidFill>
+                  <a:srgbClr val="000066"/>
+                </a:solidFill>
+                <a:latin typeface="微軟正黑體" pitchFamily="34" charset="-120"/>
+                <a:ea typeface="微軟正黑體" pitchFamily="34" charset="-120"/>
+              </a:rPr>
+              <a:t>袮</a:t>
+            </a:r>
+            <a:r>
+              <a:rPr lang="zh-TW" altLang="en-US" sz="4800" b="1" dirty="0" smtClean="0">
+                <a:solidFill>
+                  <a:srgbClr val="000066"/>
+                </a:solidFill>
+                <a:latin typeface="微軟正黑體" pitchFamily="34" charset="-120"/>
+                <a:ea typeface="微軟正黑體" pitchFamily="34" charset="-120"/>
+              </a:rPr>
+              <a:t>與</a:t>
+            </a:r>
+            <a:r>
+              <a:rPr lang="zh-TW" altLang="en-US" sz="4800" b="1" dirty="0" smtClean="0">
+                <a:solidFill>
+                  <a:srgbClr val="000066"/>
+                </a:solidFill>
+                <a:latin typeface="微軟正黑體" pitchFamily="34" charset="-120"/>
+                <a:ea typeface="微軟正黑體" pitchFamily="34" charset="-120"/>
+              </a:rPr>
+              <a:t>我同行</a:t>
+            </a:r>
+            <a:endParaRPr lang="zh-TW" altLang="en-US" sz="4800" b="1" dirty="0">
               <a:solidFill>
                 <a:srgbClr val="000066"/>
               </a:solidFill>
@@ -3122,7 +3166,7 @@
         </p:nvSpPr>
         <p:spPr>
           <a:xfrm>
-            <a:off x="0" y="1600200"/>
+            <a:off x="1524000" y="1600200"/>
             <a:ext cx="9144000" cy="5257800"/>
           </a:xfrm>
         </p:spPr>
@@ -3143,10 +3187,40 @@
                 <a:latin typeface="微軟正黑體" pitchFamily="34" charset="-120"/>
                 <a:ea typeface="微軟正黑體" pitchFamily="34" charset="-120"/>
               </a:rPr>
-              <a:t>因你與我同行</a:t>
-            </a:r>
-            <a:r>
-              <a:rPr lang="en-US" altLang="zh-TW" sz="5400" b="1" dirty="0" smtClean="0">
+              <a:t>因</a:t>
+            </a:r>
+            <a:r>
+              <a:rPr lang="zh-CN" altLang="en-US" sz="5400" b="1" dirty="0">
+                <a:solidFill>
+                  <a:srgbClr val="000066"/>
+                </a:solidFill>
+                <a:latin typeface="微軟正黑體" pitchFamily="34" charset="-120"/>
+                <a:ea typeface="微軟正黑體" pitchFamily="34" charset="-120"/>
+              </a:rPr>
+              <a:t>袮</a:t>
+            </a:r>
+            <a:r>
+              <a:rPr lang="zh-TW" altLang="en-US" sz="5400" b="1" dirty="0" smtClean="0">
+                <a:solidFill>
+                  <a:srgbClr val="000066"/>
+                </a:solidFill>
+                <a:latin typeface="微軟正黑體" pitchFamily="34" charset="-120"/>
+                <a:ea typeface="微軟正黑體" pitchFamily="34" charset="-120"/>
+              </a:rPr>
+              <a:t>與</a:t>
+            </a:r>
+            <a:r>
+              <a:rPr lang="zh-TW" altLang="en-US" sz="5400" b="1" dirty="0">
+                <a:solidFill>
+                  <a:srgbClr val="000066"/>
+                </a:solidFill>
+                <a:latin typeface="微軟正黑體" pitchFamily="34" charset="-120"/>
+                <a:ea typeface="微軟正黑體" pitchFamily="34" charset="-120"/>
+              </a:rPr>
+              <a:t>我同行</a:t>
+            </a:r>
+            <a:r>
+              <a:rPr lang="en-US" altLang="zh-TW" sz="5400" b="1" dirty="0">
                 <a:solidFill>
                   <a:srgbClr val="000066"/>
                 </a:solidFill>
@@ -3156,7 +3230,7 @@
               <a:t>  </a:t>
             </a:r>
             <a:r>
-              <a:rPr lang="zh-TW" altLang="en-US" sz="5400" b="1" dirty="0" smtClean="0">
+              <a:rPr lang="zh-TW" altLang="en-US" sz="5400" b="1" dirty="0">
                 <a:solidFill>
                   <a:srgbClr val="000066"/>
                 </a:solidFill>
@@ -3165,7 +3239,7 @@
               </a:rPr>
               <a:t>我就不會孤寂</a:t>
             </a:r>
-            <a:endParaRPr lang="en-US" altLang="zh-TW" sz="5400" b="1" dirty="0" smtClean="0">
+            <a:endParaRPr lang="en-US" altLang="zh-TW" sz="5400" b="1" dirty="0">
               <a:solidFill>
                 <a:srgbClr val="000066"/>
               </a:solidFill>
@@ -3178,6 +3252,16 @@
               <a:buNone/>
             </a:pPr>
             <a:r>
+              <a:rPr lang="zh-TW" altLang="en-US" sz="5400" b="1" dirty="0">
+                <a:solidFill>
+                  <a:srgbClr val="000066"/>
+                </a:solidFill>
+                <a:latin typeface="微軟正黑體" pitchFamily="34" charset="-120"/>
+                <a:ea typeface="微軟正黑體" pitchFamily="34" charset="-120"/>
+              </a:rPr>
+              <a:t>歡笑</a:t>
+            </a:r>
+            <a:r>
               <a:rPr lang="zh-TW" altLang="en-US" sz="5400" b="1" dirty="0" smtClean="0">
                 <a:solidFill>
                   <a:srgbClr val="000066"/>
@@ -3185,9 +3269,79 @@
                 <a:latin typeface="微軟正黑體" pitchFamily="34" charset="-120"/>
                 <a:ea typeface="微軟正黑體" pitchFamily="34" charset="-120"/>
               </a:rPr>
-              <a:t>歡笑時你同喜  憂傷時你共泣</a:t>
-            </a:r>
-            <a:endParaRPr lang="en-US" altLang="zh-TW" sz="5400" b="1" dirty="0" smtClean="0">
+              <a:t>時</a:t>
+            </a:r>
+            <a:r>
+              <a:rPr lang="zh-CN" altLang="en-US" sz="5400" b="1" dirty="0">
+                <a:solidFill>
+                  <a:srgbClr val="000066"/>
+                </a:solidFill>
+                <a:latin typeface="微軟正黑體" pitchFamily="34" charset="-120"/>
+                <a:ea typeface="微軟正黑體" pitchFamily="34" charset="-120"/>
+              </a:rPr>
+              <a:t>袮</a:t>
+            </a:r>
+            <a:r>
+              <a:rPr lang="zh-TW" altLang="en-US" sz="5400" b="1" dirty="0" smtClean="0">
+                <a:solidFill>
+                  <a:srgbClr val="000066"/>
+                </a:solidFill>
+                <a:latin typeface="微軟正黑體" pitchFamily="34" charset="-120"/>
+                <a:ea typeface="微軟正黑體" pitchFamily="34" charset="-120"/>
+              </a:rPr>
+              <a:t>同</a:t>
+            </a:r>
+            <a:r>
+              <a:rPr lang="zh-TW" altLang="en-US" sz="5400" b="1" dirty="0">
+                <a:solidFill>
+                  <a:srgbClr val="000066"/>
+                </a:solidFill>
+                <a:latin typeface="微軟正黑體" pitchFamily="34" charset="-120"/>
+                <a:ea typeface="微軟正黑體" pitchFamily="34" charset="-120"/>
+              </a:rPr>
+              <a:t>喜  憂傷</a:t>
+            </a:r>
+            <a:r>
+              <a:rPr lang="zh-TW" altLang="en-US" sz="5400" b="1" dirty="0" smtClean="0">
+                <a:solidFill>
+                  <a:srgbClr val="000066"/>
+                </a:solidFill>
+                <a:latin typeface="微軟正黑體" pitchFamily="34" charset="-120"/>
+                <a:ea typeface="微軟正黑體" pitchFamily="34" charset="-120"/>
+              </a:rPr>
+              <a:t>時</a:t>
+            </a:r>
+            <a:r>
+              <a:rPr lang="zh-CN" altLang="en-US" sz="5400" b="1" dirty="0">
+                <a:solidFill>
+                  <a:srgbClr val="000066"/>
+                </a:solidFill>
+                <a:latin typeface="微軟正黑體" pitchFamily="34" charset="-120"/>
+                <a:ea typeface="微軟正黑體" pitchFamily="34" charset="-120"/>
+              </a:rPr>
+              <a:t>袮</a:t>
+            </a:r>
+            <a:r>
+              <a:rPr lang="zh-TW" altLang="en-US" sz="5400" b="1" dirty="0" smtClean="0">
+                <a:solidFill>
+                  <a:srgbClr val="000066"/>
+                </a:solidFill>
+                <a:latin typeface="微軟正黑體" pitchFamily="34" charset="-120"/>
+                <a:ea typeface="微軟正黑體" pitchFamily="34" charset="-120"/>
+              </a:rPr>
+              <a:t>共</a:t>
+            </a:r>
+            <a:r>
+              <a:rPr lang="zh-TW" altLang="en-US" sz="5400" b="1" dirty="0">
+                <a:solidFill>
+                  <a:srgbClr val="000066"/>
+                </a:solidFill>
+                <a:latin typeface="微軟正黑體" pitchFamily="34" charset="-120"/>
+                <a:ea typeface="微軟正黑體" pitchFamily="34" charset="-120"/>
+              </a:rPr>
+              <a:t>泣</a:t>
+            </a:r>
+            <a:endParaRPr lang="en-US" altLang="zh-TW" sz="5400" b="1" dirty="0">
               <a:solidFill>
                 <a:srgbClr val="000066"/>
               </a:solidFill>
@@ -3207,9 +3361,39 @@
                 <a:latin typeface="微軟正黑體" pitchFamily="34" charset="-120"/>
                 <a:ea typeface="微軟正黑體" pitchFamily="34" charset="-120"/>
               </a:rPr>
-              <a:t>因你是我力量  我就不會絕望</a:t>
-            </a:r>
-            <a:endParaRPr lang="en-US" altLang="zh-TW" sz="5400" b="1" dirty="0" smtClean="0">
+              <a:t>因</a:t>
+            </a:r>
+            <a:r>
+              <a:rPr lang="zh-CN" altLang="en-US" sz="5400" b="1" dirty="0">
+                <a:solidFill>
+                  <a:srgbClr val="000066"/>
+                </a:solidFill>
+                <a:latin typeface="微軟正黑體" pitchFamily="34" charset="-120"/>
+                <a:ea typeface="微軟正黑體" pitchFamily="34" charset="-120"/>
+              </a:rPr>
+              <a:t>袮</a:t>
+            </a:r>
+            <a:r>
+              <a:rPr lang="zh-TW" altLang="en-US" sz="5400" b="1" dirty="0" smtClean="0">
+                <a:solidFill>
+                  <a:srgbClr val="000066"/>
+                </a:solidFill>
+                <a:latin typeface="微軟正黑體" pitchFamily="34" charset="-120"/>
+                <a:ea typeface="微軟正黑體" pitchFamily="34" charset="-120"/>
+              </a:rPr>
+              <a:t>是</a:t>
+            </a:r>
+            <a:r>
+              <a:rPr lang="zh-TW" altLang="en-US" sz="5400" b="1" dirty="0">
+                <a:solidFill>
+                  <a:srgbClr val="000066"/>
+                </a:solidFill>
+                <a:latin typeface="微軟正黑體" pitchFamily="34" charset="-120"/>
+                <a:ea typeface="微軟正黑體" pitchFamily="34" charset="-120"/>
+              </a:rPr>
+              <a:t>我力量  我就不會絕望</a:t>
+            </a:r>
+            <a:endParaRPr lang="en-US" altLang="zh-TW" sz="5400" b="1" dirty="0">
               <a:solidFill>
                 <a:srgbClr val="000066"/>
               </a:solidFill>
@@ -3222,6 +3406,16 @@
               <a:buNone/>
             </a:pPr>
             <a:r>
+              <a:rPr lang="zh-TW" altLang="en-US" sz="5400" b="1" dirty="0">
+                <a:solidFill>
+                  <a:srgbClr val="000066"/>
+                </a:solidFill>
+                <a:latin typeface="微軟正黑體" pitchFamily="34" charset="-120"/>
+                <a:ea typeface="微軟正黑體" pitchFamily="34" charset="-120"/>
+              </a:rPr>
+              <a:t>困乏軟弱中</a:t>
+            </a:r>
+            <a:r>
               <a:rPr lang="zh-TW" altLang="en-US" sz="5400" b="1" dirty="0" smtClean="0">
                 <a:solidFill>
                   <a:srgbClr val="000066"/>
@@ -3229,9 +3423,39 @@
                 <a:latin typeface="微軟正黑體" pitchFamily="34" charset="-120"/>
                 <a:ea typeface="微軟正黑體" pitchFamily="34" charset="-120"/>
               </a:rPr>
-              <a:t>困乏軟弱中有你賜恩</a:t>
-            </a:r>
-            <a:endParaRPr lang="en-US" altLang="zh-TW" sz="5400" b="1" dirty="0" smtClean="0">
+              <a:t>有</a:t>
+            </a:r>
+            <a:r>
+              <a:rPr lang="zh-CN" altLang="en-US" sz="5400" b="1" dirty="0">
+                <a:solidFill>
+                  <a:srgbClr val="000066"/>
+                </a:solidFill>
+                <a:latin typeface="微軟正黑體" pitchFamily="34" charset="-120"/>
+                <a:ea typeface="微軟正黑體" pitchFamily="34" charset="-120"/>
+              </a:rPr>
+              <a:t>袮</a:t>
+            </a:r>
+            <a:r>
+              <a:rPr lang="zh-TW" altLang="en-US" sz="5400" b="1" dirty="0" smtClean="0">
+                <a:solidFill>
+                  <a:srgbClr val="000066"/>
+                </a:solidFill>
+                <a:latin typeface="微軟正黑體" pitchFamily="34" charset="-120"/>
+                <a:ea typeface="微軟正黑體" pitchFamily="34" charset="-120"/>
+              </a:rPr>
+              <a:t>賜</a:t>
+            </a:r>
+            <a:r>
+              <a:rPr lang="zh-TW" altLang="en-US" sz="5400" b="1" dirty="0">
+                <a:solidFill>
+                  <a:srgbClr val="000066"/>
+                </a:solidFill>
+                <a:latin typeface="微軟正黑體" pitchFamily="34" charset="-120"/>
+                <a:ea typeface="微軟正黑體" pitchFamily="34" charset="-120"/>
+              </a:rPr>
+              <a:t>恩</a:t>
+            </a:r>
+            <a:endParaRPr lang="en-US" altLang="zh-TW" sz="5400" b="1" dirty="0">
               <a:solidFill>
                 <a:srgbClr val="000066"/>
               </a:solidFill>
@@ -3244,7 +3468,7 @@
               <a:buNone/>
             </a:pPr>
             <a:r>
-              <a:rPr lang="zh-TW" altLang="en-US" sz="5400" b="1" dirty="0" smtClean="0">
+              <a:rPr lang="zh-TW" altLang="en-US" sz="5400" b="1" dirty="0">
                 <a:solidFill>
                   <a:srgbClr val="000066"/>
                 </a:solidFill>
@@ -3299,16 +3523,46 @@
           <a:lstStyle/>
           <a:p>
             <a:r>
-              <a:rPr lang="zh-TW" altLang="en-US" b="1" dirty="0" smtClean="0">
-                <a:solidFill>
-                  <a:srgbClr val="000066"/>
-                </a:solidFill>
-                <a:latin typeface="微軟正黑體" pitchFamily="34" charset="-120"/>
-                <a:ea typeface="微軟正黑體" pitchFamily="34" charset="-120"/>
-              </a:rPr>
-              <a:t>因你與我同行</a:t>
-            </a:r>
-            <a:endParaRPr lang="zh-TW" altLang="en-US" b="1" dirty="0">
+              <a:rPr lang="zh-TW" altLang="en-US" sz="4800" b="1" dirty="0" smtClean="0">
+                <a:solidFill>
+                  <a:srgbClr val="000066"/>
+                </a:solidFill>
+                <a:latin typeface="微軟正黑體" pitchFamily="34" charset="-120"/>
+                <a:ea typeface="微軟正黑體" pitchFamily="34" charset="-120"/>
+              </a:rPr>
+              <a:t>因</a:t>
+            </a:r>
+            <a:r>
+              <a:rPr lang="zh-CN" altLang="en-US" sz="4800" b="1" dirty="0">
+                <a:solidFill>
+                  <a:srgbClr val="000066"/>
+                </a:solidFill>
+                <a:latin typeface="微軟正黑體" pitchFamily="34" charset="-120"/>
+                <a:ea typeface="微軟正黑體" pitchFamily="34" charset="-120"/>
+              </a:rPr>
+              <a:t>袮</a:t>
+            </a:r>
+            <a:r>
+              <a:rPr lang="zh-TW" altLang="en-US" sz="4800" b="1" dirty="0" smtClean="0">
+                <a:solidFill>
+                  <a:srgbClr val="000066"/>
+                </a:solidFill>
+                <a:latin typeface="微軟正黑體" pitchFamily="34" charset="-120"/>
+                <a:ea typeface="微軟正黑體" pitchFamily="34" charset="-120"/>
+              </a:rPr>
+              <a:t>與</a:t>
+            </a:r>
+            <a:r>
+              <a:rPr lang="zh-TW" altLang="en-US" sz="4800" b="1" dirty="0" smtClean="0">
+                <a:solidFill>
+                  <a:srgbClr val="000066"/>
+                </a:solidFill>
+                <a:latin typeface="微軟正黑體" pitchFamily="34" charset="-120"/>
+                <a:ea typeface="微軟正黑體" pitchFamily="34" charset="-120"/>
+              </a:rPr>
+              <a:t>我同行</a:t>
+            </a:r>
+            <a:endParaRPr lang="zh-TW" altLang="en-US" sz="4800" b="1" dirty="0">
               <a:solidFill>
                 <a:srgbClr val="000066"/>
               </a:solidFill>
@@ -3331,7 +3585,7 @@
         <p:spPr>
           <a:xfrm>
             <a:off x="0" y="1600200"/>
-            <a:ext cx="9144000" cy="5257800"/>
+            <a:ext cx="12192000" cy="5257800"/>
           </a:xfrm>
         </p:spPr>
         <p:txBody>
@@ -3344,6 +3598,16 @@
               <a:buNone/>
             </a:pPr>
             <a:r>
+              <a:rPr lang="zh-TW" altLang="en-US" sz="5400" b="1" dirty="0">
+                <a:solidFill>
+                  <a:srgbClr val="000066"/>
+                </a:solidFill>
+                <a:latin typeface="微軟正黑體" pitchFamily="34" charset="-120"/>
+                <a:ea typeface="微軟正黑體" pitchFamily="34" charset="-120"/>
+              </a:rPr>
+              <a:t>經風暴  過黑</a:t>
+            </a:r>
+            <a:r>
               <a:rPr lang="zh-TW" altLang="en-US" sz="5400" b="1" dirty="0" smtClean="0">
                 <a:solidFill>
                   <a:srgbClr val="000066"/>
@@ -3351,7 +3615,139 @@
                 <a:latin typeface="微軟正黑體" pitchFamily="34" charset="-120"/>
                 <a:ea typeface="微軟正黑體" pitchFamily="34" charset="-120"/>
               </a:rPr>
-              <a:t>經風暴  過黑夜</a:t>
+              <a:t>夜</a:t>
+            </a:r>
+            <a:r>
+              <a:rPr lang="en-US" altLang="zh-TW" sz="5400" b="1" dirty="0" smtClean="0">
+                <a:solidFill>
+                  <a:srgbClr val="000066"/>
+                </a:solidFill>
+                <a:latin typeface="微軟正黑體" pitchFamily="34" charset="-120"/>
+                <a:ea typeface="微軟正黑體" pitchFamily="34" charset="-120"/>
+              </a:rPr>
+              <a:t>  </a:t>
+            </a:r>
+            <a:r>
+              <a:rPr lang="zh-TW" altLang="en-US" sz="5400" b="1" dirty="0" smtClean="0">
+                <a:solidFill>
+                  <a:srgbClr val="000066"/>
+                </a:solidFill>
+                <a:latin typeface="微軟正黑體" pitchFamily="34" charset="-120"/>
+                <a:ea typeface="微軟正黑體" pitchFamily="34" charset="-120"/>
+              </a:rPr>
+              <a:t>度</a:t>
+            </a:r>
+            <a:r>
+              <a:rPr lang="zh-TW" altLang="en-US" sz="5400" b="1" dirty="0">
+                <a:solidFill>
+                  <a:srgbClr val="000066"/>
+                </a:solidFill>
+                <a:latin typeface="微軟正黑體" pitchFamily="34" charset="-120"/>
+                <a:ea typeface="微軟正黑體" pitchFamily="34" charset="-120"/>
+              </a:rPr>
+              <a:t>阡陌  越海洋</a:t>
+            </a:r>
+            <a:endParaRPr lang="en-US" altLang="zh-TW" sz="5400" b="1" dirty="0">
+              <a:solidFill>
+                <a:srgbClr val="000066"/>
+              </a:solidFill>
+              <a:latin typeface="微軟正黑體" pitchFamily="34" charset="-120"/>
+              <a:ea typeface="微軟正黑體" pitchFamily="34" charset="-120"/>
+            </a:endParaRPr>
+          </a:p>
+          <a:p>
+            <a:pPr algn="ctr">
+              <a:buNone/>
+            </a:pPr>
+            <a:r>
+              <a:rPr lang="zh-TW" altLang="en-US" sz="5400" b="1" dirty="0" smtClean="0">
+                <a:solidFill>
+                  <a:srgbClr val="000066"/>
+                </a:solidFill>
+                <a:latin typeface="微軟正黑體" pitchFamily="34" charset="-120"/>
+                <a:ea typeface="微軟正黑體" pitchFamily="34" charset="-120"/>
+              </a:rPr>
+              <a:t>有</a:t>
+            </a:r>
+            <a:r>
+              <a:rPr lang="zh-CN" altLang="en-US" sz="5400" b="1" dirty="0">
+                <a:solidFill>
+                  <a:srgbClr val="000066"/>
+                </a:solidFill>
+                <a:latin typeface="微軟正黑體" pitchFamily="34" charset="-120"/>
+                <a:ea typeface="微軟正黑體" pitchFamily="34" charset="-120"/>
+              </a:rPr>
+              <a:t>袮</a:t>
+            </a:r>
+            <a:r>
+              <a:rPr lang="zh-TW" altLang="en-US" sz="5400" b="1" dirty="0" smtClean="0">
+                <a:solidFill>
+                  <a:srgbClr val="000066"/>
+                </a:solidFill>
+                <a:latin typeface="微軟正黑體" pitchFamily="34" charset="-120"/>
+                <a:ea typeface="微軟正黑體" pitchFamily="34" charset="-120"/>
+              </a:rPr>
+              <a:t>手</a:t>
+            </a:r>
+            <a:r>
+              <a:rPr lang="zh-TW" altLang="en-US" sz="5400" b="1" dirty="0">
+                <a:solidFill>
+                  <a:srgbClr val="000066"/>
+                </a:solidFill>
+                <a:latin typeface="微軟正黑體" pitchFamily="34" charset="-120"/>
+                <a:ea typeface="微軟正黑體" pitchFamily="34" charset="-120"/>
+              </a:rPr>
+              <a:t>牽引</a:t>
+            </a:r>
+            <a:r>
+              <a:rPr lang="zh-TW" altLang="en-US" sz="5400" b="1" dirty="0" smtClean="0">
+                <a:solidFill>
+                  <a:srgbClr val="000066"/>
+                </a:solidFill>
+                <a:latin typeface="微軟正黑體" pitchFamily="34" charset="-120"/>
+                <a:ea typeface="微軟正黑體" pitchFamily="34" charset="-120"/>
+              </a:rPr>
+              <a:t>我</a:t>
+            </a:r>
+            <a:r>
+              <a:rPr lang="en-US" altLang="zh-TW" sz="5400" b="1" dirty="0" smtClean="0">
+                <a:solidFill>
+                  <a:srgbClr val="000066"/>
+                </a:solidFill>
+                <a:latin typeface="微軟正黑體" pitchFamily="34" charset="-120"/>
+                <a:ea typeface="微軟正黑體" pitchFamily="34" charset="-120"/>
+              </a:rPr>
+              <a:t>  </a:t>
+            </a:r>
+            <a:r>
+              <a:rPr lang="zh-TW" altLang="en-US" sz="5400" b="1" dirty="0" smtClean="0">
+                <a:solidFill>
+                  <a:srgbClr val="000066"/>
+                </a:solidFill>
+                <a:latin typeface="微軟正黑體" pitchFamily="34" charset="-120"/>
+                <a:ea typeface="微軟正黑體" pitchFamily="34" charset="-120"/>
+              </a:rPr>
+              <a:t>我</a:t>
+            </a:r>
+            <a:r>
+              <a:rPr lang="zh-TW" altLang="en-US" sz="5400" b="1" dirty="0">
+                <a:solidFill>
+                  <a:srgbClr val="000066"/>
+                </a:solidFill>
+                <a:latin typeface="微軟正黑體" pitchFamily="34" charset="-120"/>
+                <a:ea typeface="微軟正黑體" pitchFamily="34" charset="-120"/>
+              </a:rPr>
+              <a:t>就勇往向</a:t>
+            </a:r>
+            <a:r>
+              <a:rPr lang="zh-TW" altLang="en-US" sz="5400" b="1" dirty="0" smtClean="0">
+                <a:solidFill>
+                  <a:srgbClr val="000066"/>
+                </a:solidFill>
+                <a:latin typeface="微軟正黑體" pitchFamily="34" charset="-120"/>
+                <a:ea typeface="微軟正黑體" pitchFamily="34" charset="-120"/>
+              </a:rPr>
+              <a:t>前</a:t>
             </a:r>
             <a:endParaRPr lang="en-US" altLang="zh-TW" sz="5400" b="1" dirty="0" smtClean="0">
               <a:solidFill>
@@ -3366,6 +3762,16 @@
               <a:buNone/>
             </a:pPr>
             <a:r>
+              <a:rPr lang="zh-TW" altLang="en-US" sz="5400" b="1" dirty="0">
+                <a:solidFill>
+                  <a:srgbClr val="000066"/>
+                </a:solidFill>
+                <a:latin typeface="微軟正黑體" pitchFamily="34" charset="-120"/>
+                <a:ea typeface="微軟正黑體" pitchFamily="34" charset="-120"/>
+              </a:rPr>
+              <a:t>願我所行路</a:t>
+            </a:r>
+            <a:r>
               <a:rPr lang="zh-TW" altLang="en-US" sz="5400" b="1" dirty="0" smtClean="0">
                 <a:solidFill>
                   <a:srgbClr val="000066"/>
@@ -3373,9 +3779,39 @@
                 <a:latin typeface="微軟正黑體" pitchFamily="34" charset="-120"/>
                 <a:ea typeface="微軟正黑體" pitchFamily="34" charset="-120"/>
               </a:rPr>
-              <a:t>度阡陌  越海洋</a:t>
-            </a:r>
-            <a:endParaRPr lang="en-US" altLang="zh-TW" sz="5400" b="1" dirty="0" smtClean="0">
+              <a:t>徑</a:t>
+            </a:r>
+            <a:r>
+              <a:rPr lang="en-US" altLang="zh-TW" sz="5400" b="1" dirty="0" smtClean="0">
+                <a:solidFill>
+                  <a:srgbClr val="000066"/>
+                </a:solidFill>
+                <a:latin typeface="微軟正黑體" pitchFamily="34" charset="-120"/>
+                <a:ea typeface="微軟正黑體" pitchFamily="34" charset="-120"/>
+              </a:rPr>
+              <a:t>  </a:t>
+            </a:r>
+            <a:r>
+              <a:rPr lang="zh-TW" altLang="en-US" sz="5400" b="1" dirty="0" smtClean="0">
+                <a:solidFill>
+                  <a:srgbClr val="000066"/>
+                </a:solidFill>
+                <a:latin typeface="微軟正黑體" pitchFamily="34" charset="-120"/>
+                <a:ea typeface="微軟正黑體" pitchFamily="34" charset="-120"/>
+              </a:rPr>
+              <a:t>願</a:t>
+            </a:r>
+            <a:r>
+              <a:rPr lang="zh-TW" altLang="en-US" sz="5400" b="1" dirty="0">
+                <a:solidFill>
+                  <a:srgbClr val="000066"/>
+                </a:solidFill>
+                <a:latin typeface="微軟正黑體" pitchFamily="34" charset="-120"/>
+                <a:ea typeface="微軟正黑體" pitchFamily="34" charset="-120"/>
+              </a:rPr>
+              <a:t>我所歷際遇</a:t>
+            </a:r>
+            <a:endParaRPr lang="en-US" altLang="zh-TW" sz="5400" b="1" dirty="0">
               <a:solidFill>
                 <a:srgbClr val="000066"/>
               </a:solidFill>
@@ -3388,6 +3824,16 @@
               <a:buNone/>
             </a:pPr>
             <a:r>
+              <a:rPr lang="zh-TW" altLang="en-US" sz="5400" b="1" dirty="0">
+                <a:solidFill>
+                  <a:srgbClr val="000066"/>
+                </a:solidFill>
+                <a:latin typeface="微軟正黑體" pitchFamily="34" charset="-120"/>
+                <a:ea typeface="微軟正黑體" pitchFamily="34" charset="-120"/>
+              </a:rPr>
+              <a:t>處處留</a:t>
+            </a:r>
+            <a:r>
               <a:rPr lang="zh-TW" altLang="en-US" sz="5400" b="1" dirty="0" smtClean="0">
                 <a:solidFill>
                   <a:srgbClr val="000066"/>
@@ -3395,9 +3841,59 @@
                 <a:latin typeface="微軟正黑體" pitchFamily="34" charset="-120"/>
                 <a:ea typeface="微軟正黑體" pitchFamily="34" charset="-120"/>
               </a:rPr>
-              <a:t>有你手牽引我</a:t>
-            </a:r>
-            <a:endParaRPr lang="en-US" altLang="zh-TW" sz="5400" b="1" dirty="0" smtClean="0">
+              <a:t>下</a:t>
+            </a:r>
+            <a:r>
+              <a:rPr lang="en-US" altLang="zh-TW" sz="5400" b="1" dirty="0" smtClean="0">
+                <a:solidFill>
+                  <a:srgbClr val="000066"/>
+                </a:solidFill>
+                <a:latin typeface="微軟正黑體" pitchFamily="34" charset="-120"/>
+                <a:ea typeface="微軟正黑體" pitchFamily="34" charset="-120"/>
+              </a:rPr>
+              <a:t>  </a:t>
+            </a:r>
+            <a:r>
+              <a:rPr lang="zh-TW" altLang="en-US" sz="5400" b="1" dirty="0" smtClean="0">
+                <a:solidFill>
+                  <a:srgbClr val="000066"/>
+                </a:solidFill>
+                <a:latin typeface="微軟正黑體" pitchFamily="34" charset="-120"/>
+                <a:ea typeface="微軟正黑體" pitchFamily="34" charset="-120"/>
+              </a:rPr>
+              <a:t>有</a:t>
+            </a:r>
+            <a:r>
+              <a:rPr lang="zh-CN" altLang="en-US" sz="5400" b="1" dirty="0">
+                <a:solidFill>
+                  <a:srgbClr val="000066"/>
+                </a:solidFill>
+                <a:latin typeface="微軟正黑體" pitchFamily="34" charset="-120"/>
+                <a:ea typeface="微軟正黑體" pitchFamily="34" charset="-120"/>
+              </a:rPr>
+              <a:t>袮</a:t>
+            </a:r>
+            <a:r>
+              <a:rPr lang="zh-TW" altLang="en-US" sz="5400" b="1" dirty="0" smtClean="0">
+                <a:solidFill>
+                  <a:srgbClr val="000066"/>
+                </a:solidFill>
+                <a:latin typeface="微軟正黑體" pitchFamily="34" charset="-120"/>
+                <a:ea typeface="微軟正黑體" pitchFamily="34" charset="-120"/>
+              </a:rPr>
+              <a:t>同</a:t>
+            </a:r>
+            <a:r>
+              <a:rPr lang="zh-TW" altLang="en-US" sz="5400" b="1" dirty="0">
+                <a:solidFill>
+                  <a:srgbClr val="000066"/>
+                </a:solidFill>
+                <a:latin typeface="微軟正黑體" pitchFamily="34" charset="-120"/>
+                <a:ea typeface="微軟正黑體" pitchFamily="34" charset="-120"/>
+              </a:rPr>
+              <a:t>在的恩典痕跡</a:t>
+            </a:r>
+            <a:endParaRPr lang="en-US" altLang="zh-TW" sz="5400" b="1" dirty="0">
               <a:solidFill>
                 <a:srgbClr val="000066"/>
               </a:solidFill>
@@ -3409,47 +3905,7 @@
             <a:pPr algn="ctr">
               <a:buNone/>
             </a:pPr>
-            <a:r>
-              <a:rPr lang="zh-TW" altLang="en-US" sz="5400" b="1" dirty="0" smtClean="0">
-                <a:solidFill>
-                  <a:srgbClr val="000066"/>
-                </a:solidFill>
-                <a:latin typeface="微軟正黑體" pitchFamily="34" charset="-120"/>
-                <a:ea typeface="微軟正黑體" pitchFamily="34" charset="-120"/>
-              </a:rPr>
-              <a:t>我</a:t>
-            </a:r>
-            <a:r>
-              <a:rPr lang="zh-TW" altLang="en-US" sz="5400" b="1" dirty="0" smtClean="0">
-                <a:solidFill>
-                  <a:srgbClr val="000066"/>
-                </a:solidFill>
-                <a:latin typeface="微軟正黑體" pitchFamily="34" charset="-120"/>
-                <a:ea typeface="微軟正黑體" pitchFamily="34" charset="-120"/>
-              </a:rPr>
-              <a:t>就</a:t>
-            </a:r>
-            <a:r>
-              <a:rPr lang="zh-TW" altLang="en-US" sz="5400" b="1" dirty="0" smtClean="0">
-                <a:solidFill>
-                  <a:srgbClr val="000066"/>
-                </a:solidFill>
-                <a:latin typeface="微軟正黑體" pitchFamily="34" charset="-120"/>
-                <a:ea typeface="微軟正黑體" pitchFamily="34" charset="-120"/>
-              </a:rPr>
-              <a:t>勇往</a:t>
-            </a:r>
-            <a:r>
-              <a:rPr lang="zh-TW" altLang="en-US" sz="5400" b="1" dirty="0" smtClean="0">
-                <a:solidFill>
-                  <a:srgbClr val="000066"/>
-                </a:solidFill>
-                <a:latin typeface="微軟正黑體" pitchFamily="34" charset="-120"/>
-                <a:ea typeface="微軟正黑體" pitchFamily="34" charset="-120"/>
-              </a:rPr>
-              <a:t>向前</a:t>
-            </a:r>
-            <a:endParaRPr lang="en-US" altLang="zh-TW" sz="5400" b="1" dirty="0" smtClean="0">
+            <a:endParaRPr lang="en-US" altLang="zh-TW" sz="5400" b="1" dirty="0">
               <a:solidFill>
                 <a:srgbClr val="000066"/>
               </a:solidFill>
@@ -3502,16 +3958,46 @@
           <a:lstStyle/>
           <a:p>
             <a:r>
-              <a:rPr lang="zh-TW" altLang="en-US" b="1" dirty="0" smtClean="0">
-                <a:solidFill>
-                  <a:srgbClr val="000066"/>
-                </a:solidFill>
-                <a:latin typeface="微軟正黑體" pitchFamily="34" charset="-120"/>
-                <a:ea typeface="微軟正黑體" pitchFamily="34" charset="-120"/>
-              </a:rPr>
-              <a:t>因你與我同行</a:t>
-            </a:r>
-            <a:endParaRPr lang="zh-TW" altLang="en-US" b="1" dirty="0">
+              <a:rPr lang="zh-TW" altLang="en-US" sz="4800" b="1" dirty="0" smtClean="0">
+                <a:solidFill>
+                  <a:srgbClr val="000066"/>
+                </a:solidFill>
+                <a:latin typeface="微軟正黑體" pitchFamily="34" charset="-120"/>
+                <a:ea typeface="微軟正黑體" pitchFamily="34" charset="-120"/>
+              </a:rPr>
+              <a:t>因</a:t>
+            </a:r>
+            <a:r>
+              <a:rPr lang="zh-CN" altLang="en-US" sz="4800" b="1" dirty="0">
+                <a:solidFill>
+                  <a:srgbClr val="000066"/>
+                </a:solidFill>
+                <a:latin typeface="微軟正黑體" pitchFamily="34" charset="-120"/>
+                <a:ea typeface="微軟正黑體" pitchFamily="34" charset="-120"/>
+              </a:rPr>
+              <a:t>袮</a:t>
+            </a:r>
+            <a:r>
+              <a:rPr lang="zh-TW" altLang="en-US" sz="4800" b="1" dirty="0" smtClean="0">
+                <a:solidFill>
+                  <a:srgbClr val="000066"/>
+                </a:solidFill>
+                <a:latin typeface="微軟正黑體" pitchFamily="34" charset="-120"/>
+                <a:ea typeface="微軟正黑體" pitchFamily="34" charset="-120"/>
+              </a:rPr>
+              <a:t>與</a:t>
+            </a:r>
+            <a:r>
+              <a:rPr lang="zh-TW" altLang="en-US" sz="4800" b="1" dirty="0">
+                <a:solidFill>
+                  <a:srgbClr val="000066"/>
+                </a:solidFill>
+                <a:latin typeface="微軟正黑體" pitchFamily="34" charset="-120"/>
+                <a:ea typeface="微軟正黑體" pitchFamily="34" charset="-120"/>
+              </a:rPr>
+              <a:t>我同行</a:t>
+            </a:r>
+            <a:endParaRPr lang="zh-TW" altLang="en-US" sz="4800" b="1" dirty="0">
               <a:solidFill>
                 <a:srgbClr val="000066"/>
               </a:solidFill>
@@ -3533,13 +4019,13 @@
         </p:nvSpPr>
         <p:spPr>
           <a:xfrm>
-            <a:off x="0" y="1600200"/>
+            <a:off x="1524000" y="1600200"/>
             <a:ext cx="9144000" cy="5257800"/>
           </a:xfrm>
         </p:spPr>
         <p:txBody>
           <a:bodyPr>
-            <a:normAutofit/>
+            <a:noAutofit/>
           </a:bodyPr>
           <a:lstStyle/>
           <a:p>
@@ -3547,6 +4033,16 @@
               <a:buNone/>
             </a:pPr>
             <a:r>
+              <a:rPr lang="zh-TW" altLang="en-US" sz="5400" b="1" dirty="0">
+                <a:solidFill>
+                  <a:srgbClr val="000066"/>
+                </a:solidFill>
+                <a:latin typeface="微軟正黑體" pitchFamily="34" charset="-120"/>
+                <a:ea typeface="微軟正黑體" pitchFamily="34" charset="-120"/>
+              </a:rPr>
+              <a:t>因主</a:t>
+            </a:r>
+            <a:r>
               <a:rPr lang="zh-TW" altLang="en-US" sz="5400" b="1" dirty="0" smtClean="0">
                 <a:solidFill>
                   <a:srgbClr val="000066"/>
@@ -3554,9 +4050,19 @@
                 <a:latin typeface="微軟正黑體" pitchFamily="34" charset="-120"/>
                 <a:ea typeface="微軟正黑體" pitchFamily="34" charset="-120"/>
               </a:rPr>
-              <a:t>願我所行路徑</a:t>
-            </a:r>
-            <a:endParaRPr lang="en-US" altLang="zh-TW" sz="5400" b="1" dirty="0" smtClean="0">
+              <a:t>與你同</a:t>
+            </a:r>
+            <a:r>
+              <a:rPr lang="zh-TW" altLang="en-US" sz="5400" b="1" dirty="0">
+                <a:solidFill>
+                  <a:srgbClr val="000066"/>
+                </a:solidFill>
+                <a:latin typeface="微軟正黑體" pitchFamily="34" charset="-120"/>
+                <a:ea typeface="微軟正黑體" pitchFamily="34" charset="-120"/>
+              </a:rPr>
+              <a:t>行  你就不會孤寂</a:t>
+            </a:r>
+            <a:endParaRPr lang="en-US" altLang="zh-TW" sz="5400" b="1" dirty="0">
               <a:solidFill>
                 <a:srgbClr val="000066"/>
               </a:solidFill>
@@ -3569,16 +4075,16 @@
               <a:buNone/>
             </a:pPr>
             <a:r>
-              <a:rPr lang="zh-TW" altLang="en-US" sz="5400" b="1" dirty="0" smtClean="0">
-                <a:solidFill>
-                  <a:srgbClr val="000066"/>
-                </a:solidFill>
-                <a:latin typeface="微軟正黑體" pitchFamily="34" charset="-120"/>
-                <a:ea typeface="微軟正黑體" pitchFamily="34" charset="-120"/>
-              </a:rPr>
-              <a:t>願我所歷際遇</a:t>
-            </a:r>
-            <a:endParaRPr lang="en-US" altLang="zh-TW" sz="5400" b="1" dirty="0" smtClean="0">
+              <a:rPr lang="zh-TW" altLang="en-US" sz="5400" b="1" dirty="0">
+                <a:solidFill>
+                  <a:srgbClr val="000066"/>
+                </a:solidFill>
+                <a:latin typeface="微軟正黑體" pitchFamily="34" charset="-120"/>
+                <a:ea typeface="微軟正黑體" pitchFamily="34" charset="-120"/>
+              </a:rPr>
+              <a:t>歡笑時祂同喜  憂傷時祂共泣</a:t>
+            </a:r>
+            <a:endParaRPr lang="en-US" altLang="zh-TW" sz="5400" b="1" dirty="0">
               <a:solidFill>
                 <a:srgbClr val="000066"/>
               </a:solidFill>
@@ -3591,16 +4097,16 @@
               <a:buNone/>
             </a:pPr>
             <a:r>
-              <a:rPr lang="zh-TW" altLang="en-US" sz="5400" b="1" dirty="0" smtClean="0">
-                <a:solidFill>
-                  <a:srgbClr val="000066"/>
-                </a:solidFill>
-                <a:latin typeface="微軟正黑體" pitchFamily="34" charset="-120"/>
-                <a:ea typeface="微軟正黑體" pitchFamily="34" charset="-120"/>
-              </a:rPr>
-              <a:t>處處留下</a:t>
-            </a:r>
-            <a:endParaRPr lang="en-US" altLang="zh-TW" sz="5400" b="1" dirty="0" smtClean="0">
+              <a:rPr lang="zh-TW" altLang="en-US" sz="5400" b="1" dirty="0">
+                <a:solidFill>
+                  <a:srgbClr val="000066"/>
+                </a:solidFill>
+                <a:latin typeface="微軟正黑體" pitchFamily="34" charset="-120"/>
+                <a:ea typeface="微軟正黑體" pitchFamily="34" charset="-120"/>
+              </a:rPr>
+              <a:t>因主是你力量  你就不會絕望</a:t>
+            </a:r>
+            <a:endParaRPr lang="en-US" altLang="zh-TW" sz="5400" b="1" dirty="0">
               <a:solidFill>
                 <a:srgbClr val="000066"/>
               </a:solidFill>
@@ -3613,22 +4119,37 @@
               <a:buNone/>
             </a:pPr>
             <a:r>
-              <a:rPr lang="zh-TW" altLang="en-US" sz="5400" b="1" dirty="0" smtClean="0">
-                <a:solidFill>
-                  <a:srgbClr val="000066"/>
-                </a:solidFill>
-                <a:latin typeface="微軟正黑體" pitchFamily="34" charset="-120"/>
-                <a:ea typeface="微軟正黑體" pitchFamily="34" charset="-120"/>
-              </a:rPr>
-              <a:t>有你同在的恩典痕跡</a:t>
-            </a:r>
-            <a:endParaRPr lang="en-US" altLang="zh-TW" sz="5400" b="1" dirty="0" smtClean="0">
+              <a:rPr lang="zh-TW" altLang="en-US" sz="5400" b="1" dirty="0">
+                <a:solidFill>
+                  <a:srgbClr val="000066"/>
+                </a:solidFill>
+                <a:latin typeface="微軟正黑體" pitchFamily="34" charset="-120"/>
+                <a:ea typeface="微軟正黑體" pitchFamily="34" charset="-120"/>
+              </a:rPr>
+              <a:t>困乏軟弱中有祂賜恩</a:t>
+            </a:r>
+            <a:endParaRPr lang="en-US" altLang="zh-TW" sz="5400" b="1" dirty="0">
               <a:solidFill>
                 <a:srgbClr val="000066"/>
               </a:solidFill>
               <a:latin typeface="微軟正黑體" pitchFamily="34" charset="-120"/>
               <a:ea typeface="微軟正黑體" pitchFamily="34" charset="-120"/>
             </a:endParaRPr>
+          </a:p>
+          <a:p>
+            <a:pPr algn="ctr">
+              <a:buNone/>
+            </a:pPr>
+            <a:r>
+              <a:rPr lang="zh-TW" altLang="en-US" sz="5400" b="1" dirty="0">
+                <a:solidFill>
+                  <a:srgbClr val="000066"/>
+                </a:solidFill>
+                <a:latin typeface="微軟正黑體" pitchFamily="34" charset="-120"/>
+                <a:ea typeface="微軟正黑體" pitchFamily="34" charset="-120"/>
+              </a:rPr>
+              <a:t>你就得剛強</a:t>
+            </a:r>
           </a:p>
         </p:txBody>
       </p:sp>
@@ -3675,16 +4196,46 @@
           <a:lstStyle/>
           <a:p>
             <a:r>
-              <a:rPr lang="zh-TW" altLang="en-US" b="1" dirty="0" smtClean="0">
-                <a:solidFill>
-                  <a:srgbClr val="000066"/>
-                </a:solidFill>
-                <a:latin typeface="微軟正黑體" pitchFamily="34" charset="-120"/>
-                <a:ea typeface="微軟正黑體" pitchFamily="34" charset="-120"/>
-              </a:rPr>
-              <a:t>因你與我同行</a:t>
-            </a:r>
-            <a:endParaRPr lang="zh-TW" altLang="en-US" b="1" dirty="0">
+              <a:rPr lang="zh-TW" altLang="en-US" sz="4800" b="1" dirty="0" smtClean="0">
+                <a:solidFill>
+                  <a:srgbClr val="000066"/>
+                </a:solidFill>
+                <a:latin typeface="微軟正黑體" pitchFamily="34" charset="-120"/>
+                <a:ea typeface="微軟正黑體" pitchFamily="34" charset="-120"/>
+              </a:rPr>
+              <a:t>因</a:t>
+            </a:r>
+            <a:r>
+              <a:rPr lang="zh-CN" altLang="en-US" sz="4800" b="1" dirty="0">
+                <a:solidFill>
+                  <a:srgbClr val="000066"/>
+                </a:solidFill>
+                <a:latin typeface="微軟正黑體" pitchFamily="34" charset="-120"/>
+                <a:ea typeface="微軟正黑體" pitchFamily="34" charset="-120"/>
+              </a:rPr>
+              <a:t>袮</a:t>
+            </a:r>
+            <a:r>
+              <a:rPr lang="zh-TW" altLang="en-US" sz="4800" b="1" dirty="0" smtClean="0">
+                <a:solidFill>
+                  <a:srgbClr val="000066"/>
+                </a:solidFill>
+                <a:latin typeface="微軟正黑體" pitchFamily="34" charset="-120"/>
+                <a:ea typeface="微軟正黑體" pitchFamily="34" charset="-120"/>
+              </a:rPr>
+              <a:t>與</a:t>
+            </a:r>
+            <a:r>
+              <a:rPr lang="zh-TW" altLang="en-US" sz="4800" b="1" dirty="0">
+                <a:solidFill>
+                  <a:srgbClr val="000066"/>
+                </a:solidFill>
+                <a:latin typeface="微軟正黑體" pitchFamily="34" charset="-120"/>
+                <a:ea typeface="微軟正黑體" pitchFamily="34" charset="-120"/>
+              </a:rPr>
+              <a:t>我同行</a:t>
+            </a:r>
+            <a:endParaRPr lang="zh-TW" altLang="en-US" sz="4800" b="1" dirty="0">
               <a:solidFill>
                 <a:srgbClr val="000066"/>
               </a:solidFill>
@@ -3707,12 +4258,12 @@
         <p:spPr>
           <a:xfrm>
             <a:off x="0" y="1600200"/>
-            <a:ext cx="9144000" cy="5257800"/>
+            <a:ext cx="12192000" cy="5257800"/>
           </a:xfrm>
         </p:spPr>
         <p:txBody>
           <a:bodyPr>
-            <a:noAutofit/>
+            <a:normAutofit/>
           </a:bodyPr>
           <a:lstStyle/>
           <a:p>
@@ -3720,6 +4271,16 @@
               <a:buNone/>
             </a:pPr>
             <a:r>
+              <a:rPr lang="zh-TW" altLang="en-US" sz="5400" b="1" dirty="0">
+                <a:solidFill>
+                  <a:srgbClr val="000066"/>
+                </a:solidFill>
+                <a:latin typeface="微軟正黑體" pitchFamily="34" charset="-120"/>
+                <a:ea typeface="微軟正黑體" pitchFamily="34" charset="-120"/>
+              </a:rPr>
+              <a:t>經風暴  過黑</a:t>
+            </a:r>
+            <a:r>
               <a:rPr lang="zh-TW" altLang="en-US" sz="5400" b="1" dirty="0" smtClean="0">
                 <a:solidFill>
                   <a:srgbClr val="000066"/>
@@ -3727,7 +4288,47 @@
                 <a:latin typeface="微軟正黑體" pitchFamily="34" charset="-120"/>
                 <a:ea typeface="微軟正黑體" pitchFamily="34" charset="-120"/>
               </a:rPr>
-              <a:t>因主與你同行  你就不會孤寂</a:t>
+              <a:t>夜</a:t>
+            </a:r>
+            <a:r>
+              <a:rPr lang="en-US" altLang="zh-TW" sz="5400" b="1" dirty="0" smtClean="0">
+                <a:solidFill>
+                  <a:srgbClr val="000066"/>
+                </a:solidFill>
+                <a:latin typeface="微軟正黑體" pitchFamily="34" charset="-120"/>
+                <a:ea typeface="微軟正黑體" pitchFamily="34" charset="-120"/>
+              </a:rPr>
+              <a:t>  </a:t>
+            </a:r>
+            <a:r>
+              <a:rPr lang="zh-TW" altLang="en-US" sz="5400" b="1" dirty="0" smtClean="0">
+                <a:solidFill>
+                  <a:srgbClr val="000066"/>
+                </a:solidFill>
+                <a:latin typeface="微軟正黑體" pitchFamily="34" charset="-120"/>
+                <a:ea typeface="微軟正黑體" pitchFamily="34" charset="-120"/>
+              </a:rPr>
+              <a:t>度</a:t>
+            </a:r>
+            <a:r>
+              <a:rPr lang="zh-TW" altLang="en-US" sz="5400" b="1" dirty="0">
+                <a:solidFill>
+                  <a:srgbClr val="000066"/>
+                </a:solidFill>
+                <a:latin typeface="微軟正黑體" pitchFamily="34" charset="-120"/>
+                <a:ea typeface="微軟正黑體" pitchFamily="34" charset="-120"/>
+              </a:rPr>
+              <a:t>阡陌  越海</a:t>
+            </a:r>
+            <a:r>
+              <a:rPr lang="zh-TW" altLang="en-US" sz="5400" b="1" dirty="0" smtClean="0">
+                <a:solidFill>
+                  <a:srgbClr val="000066"/>
+                </a:solidFill>
+                <a:latin typeface="微軟正黑體" pitchFamily="34" charset="-120"/>
+                <a:ea typeface="微軟正黑體" pitchFamily="34" charset="-120"/>
+              </a:rPr>
+              <a:t>洋</a:t>
             </a:r>
             <a:endParaRPr lang="en-US" altLang="zh-TW" sz="5400" b="1" dirty="0" smtClean="0">
               <a:solidFill>
@@ -3749,7 +4350,67 @@
                 <a:latin typeface="微軟正黑體" pitchFamily="34" charset="-120"/>
                 <a:ea typeface="微軟正黑體" pitchFamily="34" charset="-120"/>
               </a:rPr>
-              <a:t>歡笑時祂同喜  憂傷時祂共泣</a:t>
+              <a:t>有</a:t>
+            </a:r>
+            <a:r>
+              <a:rPr lang="zh-TW" altLang="en-US" sz="5400" b="1" dirty="0">
+                <a:solidFill>
+                  <a:srgbClr val="000066"/>
+                </a:solidFill>
+                <a:latin typeface="微軟正黑體" pitchFamily="34" charset="-120"/>
+                <a:ea typeface="微軟正黑體" pitchFamily="34" charset="-120"/>
+              </a:rPr>
+              <a:t>主手牽引</a:t>
+            </a:r>
+            <a:r>
+              <a:rPr lang="zh-TW" altLang="en-US" sz="5400" b="1" dirty="0" smtClean="0">
+                <a:solidFill>
+                  <a:srgbClr val="000066"/>
+                </a:solidFill>
+                <a:latin typeface="微軟正黑體" pitchFamily="34" charset="-120"/>
+                <a:ea typeface="微軟正黑體" pitchFamily="34" charset="-120"/>
+              </a:rPr>
+              <a:t>你</a:t>
+            </a:r>
+            <a:r>
+              <a:rPr lang="en-US" altLang="zh-TW" sz="5400" b="1" dirty="0" smtClean="0">
+                <a:solidFill>
+                  <a:srgbClr val="000066"/>
+                </a:solidFill>
+                <a:latin typeface="微軟正黑體" pitchFamily="34" charset="-120"/>
+                <a:ea typeface="微軟正黑體" pitchFamily="34" charset="-120"/>
+              </a:rPr>
+              <a:t>  </a:t>
+            </a:r>
+            <a:r>
+              <a:rPr lang="zh-TW" altLang="en-US" sz="5400" b="1" dirty="0" smtClean="0">
+                <a:solidFill>
+                  <a:srgbClr val="000066"/>
+                </a:solidFill>
+                <a:latin typeface="微軟正黑體" pitchFamily="34" charset="-120"/>
+                <a:ea typeface="微軟正黑體" pitchFamily="34" charset="-120"/>
+              </a:rPr>
+              <a:t>你</a:t>
+            </a:r>
+            <a:r>
+              <a:rPr lang="zh-TW" altLang="en-US" sz="5400" b="1" dirty="0">
+                <a:solidFill>
+                  <a:srgbClr val="000066"/>
+                </a:solidFill>
+                <a:latin typeface="微軟正黑體" pitchFamily="34" charset="-120"/>
+                <a:ea typeface="微軟正黑體" pitchFamily="34" charset="-120"/>
+              </a:rPr>
+              <a:t>就勇往向</a:t>
+            </a:r>
+            <a:r>
+              <a:rPr lang="zh-TW" altLang="en-US" sz="5400" b="1" dirty="0" smtClean="0">
+                <a:solidFill>
+                  <a:srgbClr val="000066"/>
+                </a:solidFill>
+                <a:latin typeface="微軟正黑體" pitchFamily="34" charset="-120"/>
+                <a:ea typeface="微軟正黑體" pitchFamily="34" charset="-120"/>
+              </a:rPr>
+              <a:t>前</a:t>
             </a:r>
             <a:endParaRPr lang="en-US" altLang="zh-TW" sz="5400" b="1" dirty="0" smtClean="0">
               <a:solidFill>
@@ -3764,6 +4425,16 @@
               <a:buNone/>
             </a:pPr>
             <a:r>
+              <a:rPr lang="zh-TW" altLang="en-US" sz="5400" b="1" dirty="0">
+                <a:solidFill>
+                  <a:srgbClr val="000066"/>
+                </a:solidFill>
+                <a:latin typeface="微軟正黑體" pitchFamily="34" charset="-120"/>
+                <a:ea typeface="微軟正黑體" pitchFamily="34" charset="-120"/>
+              </a:rPr>
+              <a:t>願你所行路</a:t>
+            </a:r>
+            <a:r>
               <a:rPr lang="zh-TW" altLang="en-US" sz="5400" b="1" dirty="0" smtClean="0">
                 <a:solidFill>
                   <a:srgbClr val="000066"/>
@@ -3771,9 +4442,39 @@
                 <a:latin typeface="微軟正黑體" pitchFamily="34" charset="-120"/>
                 <a:ea typeface="微軟正黑體" pitchFamily="34" charset="-120"/>
               </a:rPr>
-              <a:t>因主是你力量  你就不會絕望</a:t>
-            </a:r>
-            <a:endParaRPr lang="en-US" altLang="zh-TW" sz="5400" b="1" dirty="0" smtClean="0">
+              <a:t>徑</a:t>
+            </a:r>
+            <a:r>
+              <a:rPr lang="en-US" altLang="zh-TW" sz="5400" b="1" dirty="0" smtClean="0">
+                <a:solidFill>
+                  <a:srgbClr val="000066"/>
+                </a:solidFill>
+                <a:latin typeface="微軟正黑體" pitchFamily="34" charset="-120"/>
+                <a:ea typeface="微軟正黑體" pitchFamily="34" charset="-120"/>
+              </a:rPr>
+              <a:t>  </a:t>
+            </a:r>
+            <a:r>
+              <a:rPr lang="zh-TW" altLang="en-US" sz="5400" b="1" dirty="0" smtClean="0">
+                <a:solidFill>
+                  <a:srgbClr val="000066"/>
+                </a:solidFill>
+                <a:latin typeface="微軟正黑體" pitchFamily="34" charset="-120"/>
+                <a:ea typeface="微軟正黑體" pitchFamily="34" charset="-120"/>
+              </a:rPr>
+              <a:t>願</a:t>
+            </a:r>
+            <a:r>
+              <a:rPr lang="zh-TW" altLang="en-US" sz="5400" b="1" dirty="0">
+                <a:solidFill>
+                  <a:srgbClr val="000066"/>
+                </a:solidFill>
+                <a:latin typeface="微軟正黑體" pitchFamily="34" charset="-120"/>
+                <a:ea typeface="微軟正黑體" pitchFamily="34" charset="-120"/>
+              </a:rPr>
+              <a:t>你所曆際遇</a:t>
+            </a:r>
+            <a:endParaRPr lang="en-US" altLang="zh-TW" sz="5400" b="1" dirty="0">
               <a:solidFill>
                 <a:srgbClr val="000066"/>
               </a:solidFill>
@@ -3786,6 +4487,16 @@
               <a:buNone/>
             </a:pPr>
             <a:r>
+              <a:rPr lang="zh-TW" altLang="en-US" sz="5400" b="1" dirty="0">
+                <a:solidFill>
+                  <a:srgbClr val="000066"/>
+                </a:solidFill>
+                <a:latin typeface="微軟正黑體" pitchFamily="34" charset="-120"/>
+                <a:ea typeface="微軟正黑體" pitchFamily="34" charset="-120"/>
+              </a:rPr>
+              <a:t>處處留</a:t>
+            </a:r>
+            <a:r>
               <a:rPr lang="zh-TW" altLang="en-US" sz="5400" b="1" dirty="0" smtClean="0">
                 <a:solidFill>
                   <a:srgbClr val="000066"/>
@@ -3793,367 +4504,19 @@
                 <a:latin typeface="微軟正黑體" pitchFamily="34" charset="-120"/>
                 <a:ea typeface="微軟正黑體" pitchFamily="34" charset="-120"/>
               </a:rPr>
-              <a:t>困乏軟弱中有祂賜恩</a:t>
-            </a:r>
-            <a:endParaRPr lang="en-US" altLang="zh-TW" sz="5400" b="1" dirty="0" smtClean="0">
-              <a:solidFill>
-                <a:srgbClr val="000066"/>
-              </a:solidFill>
-              <a:latin typeface="微軟正黑體" pitchFamily="34" charset="-120"/>
-              <a:ea typeface="微軟正黑體" pitchFamily="34" charset="-120"/>
-            </a:endParaRPr>
-          </a:p>
-          <a:p>
-            <a:pPr algn="ctr">
-              <a:buNone/>
-            </a:pPr>
-            <a:r>
-              <a:rPr lang="zh-TW" altLang="en-US" sz="5400" b="1" dirty="0" smtClean="0">
-                <a:solidFill>
-                  <a:srgbClr val="000066"/>
-                </a:solidFill>
-                <a:latin typeface="微軟正黑體" pitchFamily="34" charset="-120"/>
-                <a:ea typeface="微軟正黑體" pitchFamily="34" charset="-120"/>
-              </a:rPr>
-              <a:t>你就得剛強</a:t>
-            </a:r>
-          </a:p>
-        </p:txBody>
-      </p:sp>
-    </p:spTree>
-  </p:cSld>
-  <p:clrMapOvr>
-    <a:masterClrMapping/>
-  </p:clrMapOvr>
-</p:sld>
-</file>
-
-<file path=ppt/slides/slide5.xml><?xml version="1.0" encoding="utf-8"?>
-<p:sld xmlns:a="http://schemas.openxmlformats.org/drawingml/2006/main" xmlns:r="http://schemas.openxmlformats.org/officeDocument/2006/relationships" xmlns:p="http://schemas.openxmlformats.org/presentationml/2006/main">
-  <p:cSld>
-    <p:spTree>
-      <p:nvGrpSpPr>
-        <p:cNvPr id="1" name=""/>
-        <p:cNvGrpSpPr/>
-        <p:nvPr/>
-      </p:nvGrpSpPr>
-      <p:grpSpPr>
-        <a:xfrm>
-          <a:off x="0" y="0"/>
-          <a:ext cx="0" cy="0"/>
-          <a:chOff x="0" y="0"/>
-          <a:chExt cx="0" cy="0"/>
-        </a:xfrm>
-      </p:grpSpPr>
-      <p:sp>
-        <p:nvSpPr>
-          <p:cNvPr id="4" name="標題 3"/>
-          <p:cNvSpPr>
-            <a:spLocks noGrp="1"/>
-          </p:cNvSpPr>
-          <p:nvPr>
-            <p:ph type="title"/>
-          </p:nvPr>
-        </p:nvSpPr>
-        <p:spPr/>
-        <p:txBody>
-          <a:bodyPr>
-            <a:normAutofit/>
-          </a:bodyPr>
-          <a:lstStyle/>
-          <a:p>
-            <a:r>
-              <a:rPr lang="zh-TW" altLang="en-US" b="1" dirty="0" smtClean="0">
-                <a:solidFill>
-                  <a:srgbClr val="000066"/>
-                </a:solidFill>
-                <a:latin typeface="微軟正黑體" pitchFamily="34" charset="-120"/>
-                <a:ea typeface="微軟正黑體" pitchFamily="34" charset="-120"/>
-              </a:rPr>
-              <a:t>因你與我同行</a:t>
-            </a:r>
-            <a:endParaRPr lang="zh-TW" altLang="en-US" b="1" dirty="0">
-              <a:solidFill>
-                <a:srgbClr val="000066"/>
-              </a:solidFill>
-              <a:latin typeface="微軟正黑體" pitchFamily="34" charset="-120"/>
-              <a:ea typeface="微軟正黑體" pitchFamily="34" charset="-120"/>
-            </a:endParaRPr>
-          </a:p>
-        </p:txBody>
-      </p:sp>
-      <p:sp>
-        <p:nvSpPr>
-          <p:cNvPr id="5" name="內容版面配置區 4"/>
-          <p:cNvSpPr>
-            <a:spLocks noGrp="1"/>
-          </p:cNvSpPr>
-          <p:nvPr>
-            <p:ph idx="1"/>
-          </p:nvPr>
-        </p:nvSpPr>
-        <p:spPr>
-          <a:xfrm>
-            <a:off x="0" y="1600200"/>
-            <a:ext cx="9144000" cy="5257800"/>
-          </a:xfrm>
-        </p:spPr>
-        <p:txBody>
-          <a:bodyPr>
-            <a:normAutofit/>
-          </a:bodyPr>
-          <a:lstStyle/>
-          <a:p>
-            <a:pPr algn="ctr">
-              <a:buNone/>
-            </a:pPr>
-            <a:r>
-              <a:rPr lang="zh-TW" altLang="en-US" sz="5400" b="1" dirty="0" smtClean="0">
-                <a:solidFill>
-                  <a:srgbClr val="000066"/>
-                </a:solidFill>
-                <a:latin typeface="微軟正黑體" pitchFamily="34" charset="-120"/>
-                <a:ea typeface="微軟正黑體" pitchFamily="34" charset="-120"/>
-              </a:rPr>
-              <a:t>經風暴  過黑夜</a:t>
-            </a:r>
-            <a:endParaRPr lang="en-US" altLang="zh-TW" sz="5400" b="1" dirty="0" smtClean="0">
-              <a:solidFill>
-                <a:srgbClr val="000066"/>
-              </a:solidFill>
-              <a:latin typeface="微軟正黑體" pitchFamily="34" charset="-120"/>
-              <a:ea typeface="微軟正黑體" pitchFamily="34" charset="-120"/>
-            </a:endParaRPr>
-          </a:p>
-          <a:p>
-            <a:pPr algn="ctr">
-              <a:buNone/>
-            </a:pPr>
-            <a:r>
-              <a:rPr lang="zh-TW" altLang="en-US" sz="5400" b="1" dirty="0" smtClean="0">
-                <a:solidFill>
-                  <a:srgbClr val="000066"/>
-                </a:solidFill>
-                <a:latin typeface="微軟正黑體" pitchFamily="34" charset="-120"/>
-                <a:ea typeface="微軟正黑體" pitchFamily="34" charset="-120"/>
-              </a:rPr>
-              <a:t>度阡陌  越海洋</a:t>
-            </a:r>
-            <a:br>
-              <a:rPr lang="zh-TW" altLang="en-US" sz="5400" b="1" dirty="0" smtClean="0">
-                <a:solidFill>
-                  <a:srgbClr val="000066"/>
-                </a:solidFill>
-                <a:latin typeface="微軟正黑體" pitchFamily="34" charset="-120"/>
-                <a:ea typeface="微軟正黑體" pitchFamily="34" charset="-120"/>
-              </a:rPr>
-            </a:br>
-            <a:r>
-              <a:rPr lang="zh-TW" altLang="en-US" sz="5400" b="1" dirty="0" smtClean="0">
-                <a:solidFill>
-                  <a:srgbClr val="000066"/>
-                </a:solidFill>
-                <a:latin typeface="微軟正黑體" pitchFamily="34" charset="-120"/>
-                <a:ea typeface="微軟正黑體" pitchFamily="34" charset="-120"/>
-              </a:rPr>
-              <a:t>有主手牽引你</a:t>
-            </a:r>
-            <a:endParaRPr lang="en-US" altLang="zh-TW" sz="5400" b="1" dirty="0" smtClean="0">
-              <a:solidFill>
-                <a:srgbClr val="000066"/>
-              </a:solidFill>
-              <a:latin typeface="微軟正黑體" pitchFamily="34" charset="-120"/>
-              <a:ea typeface="微軟正黑體" pitchFamily="34" charset="-120"/>
-            </a:endParaRPr>
-          </a:p>
-          <a:p>
-            <a:pPr algn="ctr">
-              <a:buNone/>
-            </a:pPr>
-            <a:r>
-              <a:rPr lang="zh-TW" altLang="en-US" sz="5400" b="1" dirty="0" smtClean="0">
-                <a:solidFill>
-                  <a:srgbClr val="000066"/>
-                </a:solidFill>
-                <a:latin typeface="微軟正黑體" pitchFamily="34" charset="-120"/>
-                <a:ea typeface="微軟正黑體" pitchFamily="34" charset="-120"/>
-              </a:rPr>
-              <a:t>你就勇往向前</a:t>
-            </a:r>
-            <a:endParaRPr lang="en-US" altLang="zh-TW" sz="5400" b="1" dirty="0" smtClean="0">
-              <a:solidFill>
-                <a:srgbClr val="000066"/>
-              </a:solidFill>
-              <a:latin typeface="微軟正黑體" pitchFamily="34" charset="-120"/>
-              <a:ea typeface="微軟正黑體" pitchFamily="34" charset="-120"/>
-            </a:endParaRPr>
-          </a:p>
-        </p:txBody>
-      </p:sp>
-    </p:spTree>
-  </p:cSld>
-  <p:clrMapOvr>
-    <a:masterClrMapping/>
-  </p:clrMapOvr>
-</p:sld>
-</file>
-
-<file path=ppt/slides/slide6.xml><?xml version="1.0" encoding="utf-8"?>
-<p:sld xmlns:a="http://schemas.openxmlformats.org/drawingml/2006/main" xmlns:r="http://schemas.openxmlformats.org/officeDocument/2006/relationships" xmlns:p="http://schemas.openxmlformats.org/presentationml/2006/main">
-  <p:cSld>
-    <p:spTree>
-      <p:nvGrpSpPr>
-        <p:cNvPr id="1" name=""/>
-        <p:cNvGrpSpPr/>
-        <p:nvPr/>
-      </p:nvGrpSpPr>
-      <p:grpSpPr>
-        <a:xfrm>
-          <a:off x="0" y="0"/>
-          <a:ext cx="0" cy="0"/>
-          <a:chOff x="0" y="0"/>
-          <a:chExt cx="0" cy="0"/>
-        </a:xfrm>
-      </p:grpSpPr>
-      <p:sp>
-        <p:nvSpPr>
-          <p:cNvPr id="4" name="標題 3"/>
-          <p:cNvSpPr>
-            <a:spLocks noGrp="1"/>
-          </p:cNvSpPr>
-          <p:nvPr>
-            <p:ph type="title"/>
-          </p:nvPr>
-        </p:nvSpPr>
-        <p:spPr/>
-        <p:txBody>
-          <a:bodyPr>
-            <a:normAutofit/>
-          </a:bodyPr>
-          <a:lstStyle/>
-          <a:p>
-            <a:r>
-              <a:rPr lang="zh-TW" altLang="en-US" b="1" dirty="0" smtClean="0">
-                <a:solidFill>
-                  <a:srgbClr val="000066"/>
-                </a:solidFill>
-                <a:latin typeface="微軟正黑體" pitchFamily="34" charset="-120"/>
-                <a:ea typeface="微軟正黑體" pitchFamily="34" charset="-120"/>
-              </a:rPr>
-              <a:t>因你與我同行</a:t>
-            </a:r>
-            <a:endParaRPr lang="zh-TW" altLang="en-US" b="1" dirty="0">
-              <a:solidFill>
-                <a:srgbClr val="000066"/>
-              </a:solidFill>
-              <a:latin typeface="微軟正黑體" pitchFamily="34" charset="-120"/>
-              <a:ea typeface="微軟正黑體" pitchFamily="34" charset="-120"/>
-            </a:endParaRPr>
-          </a:p>
-        </p:txBody>
-      </p:sp>
-      <p:sp>
-        <p:nvSpPr>
-          <p:cNvPr id="5" name="內容版面配置區 4"/>
-          <p:cNvSpPr>
-            <a:spLocks noGrp="1"/>
-          </p:cNvSpPr>
-          <p:nvPr>
-            <p:ph idx="1"/>
-          </p:nvPr>
-        </p:nvSpPr>
-        <p:spPr>
-          <a:xfrm>
-            <a:off x="0" y="1600200"/>
-            <a:ext cx="9144000" cy="5257800"/>
-          </a:xfrm>
-        </p:spPr>
-        <p:txBody>
-          <a:bodyPr>
-            <a:normAutofit/>
-          </a:bodyPr>
-          <a:lstStyle/>
-          <a:p>
-            <a:pPr algn="ctr">
-              <a:buNone/>
-            </a:pPr>
-            <a:r>
-              <a:rPr lang="zh-TW" altLang="en-US" sz="5400" b="1" dirty="0" smtClean="0">
-                <a:solidFill>
-                  <a:srgbClr val="000066"/>
-                </a:solidFill>
-                <a:latin typeface="微軟正黑體" pitchFamily="34" charset="-120"/>
-                <a:ea typeface="微軟正黑體" pitchFamily="34" charset="-120"/>
-              </a:rPr>
-              <a:t>願你所行路徑</a:t>
-            </a:r>
-            <a:endParaRPr lang="en-US" altLang="zh-TW" sz="5400" b="1" dirty="0" smtClean="0">
-              <a:solidFill>
-                <a:srgbClr val="000066"/>
-              </a:solidFill>
-              <a:latin typeface="微軟正黑體" pitchFamily="34" charset="-120"/>
-              <a:ea typeface="微軟正黑體" pitchFamily="34" charset="-120"/>
-            </a:endParaRPr>
-          </a:p>
-          <a:p>
-            <a:pPr algn="ctr">
-              <a:buNone/>
-            </a:pPr>
-            <a:r>
-              <a:rPr lang="zh-TW" altLang="en-US" sz="5400" b="1" dirty="0" smtClean="0">
-                <a:solidFill>
-                  <a:srgbClr val="000066"/>
-                </a:solidFill>
-                <a:latin typeface="微軟正黑體" pitchFamily="34" charset="-120"/>
-                <a:ea typeface="微軟正黑體" pitchFamily="34" charset="-120"/>
-              </a:rPr>
-              <a:t>願你所曆際遇</a:t>
-            </a:r>
-            <a:endParaRPr lang="en-US" altLang="zh-TW" sz="5400" b="1" dirty="0" smtClean="0">
-              <a:solidFill>
-                <a:srgbClr val="000066"/>
-              </a:solidFill>
-              <a:latin typeface="微軟正黑體" pitchFamily="34" charset="-120"/>
-              <a:ea typeface="微軟正黑體" pitchFamily="34" charset="-120"/>
-            </a:endParaRPr>
-          </a:p>
-          <a:p>
-            <a:pPr algn="ctr">
-              <a:buNone/>
-            </a:pPr>
-            <a:r>
-              <a:rPr lang="zh-TW" altLang="en-US" sz="5400" b="1" dirty="0" smtClean="0">
-                <a:solidFill>
-                  <a:srgbClr val="000066"/>
-                </a:solidFill>
-                <a:latin typeface="微軟正黑體" pitchFamily="34" charset="-120"/>
-                <a:ea typeface="微軟正黑體" pitchFamily="34" charset="-120"/>
-              </a:rPr>
-              <a:t>處處留</a:t>
-            </a:r>
-            <a:endParaRPr lang="en-US" altLang="zh-TW" sz="5400" b="1" dirty="0" smtClean="0">
-              <a:solidFill>
-                <a:srgbClr val="000066"/>
-              </a:solidFill>
-              <a:latin typeface="微軟正黑體" pitchFamily="34" charset="-120"/>
-              <a:ea typeface="微軟正黑體" pitchFamily="34" charset="-120"/>
-            </a:endParaRPr>
-          </a:p>
-          <a:p>
-            <a:pPr algn="ctr">
-              <a:buNone/>
-            </a:pPr>
-            <a:r>
-              <a:rPr lang="zh-TW" altLang="en-US" sz="5400" b="1" dirty="0" smtClean="0">
-                <a:solidFill>
-                  <a:srgbClr val="000066"/>
-                </a:solidFill>
-                <a:latin typeface="微軟正黑體" pitchFamily="34" charset="-120"/>
-                <a:ea typeface="微軟正黑體" pitchFamily="34" charset="-120"/>
-              </a:rPr>
-              <a:t>有主同在的恩典痕跡</a:t>
-            </a:r>
-            <a:endParaRPr lang="en-US" altLang="zh-TW" sz="5400" b="1" dirty="0" smtClean="0">
+              <a:t>下  有</a:t>
+            </a:r>
+            <a:r>
+              <a:rPr lang="zh-TW" altLang="en-US" sz="5400" b="1" dirty="0">
+                <a:solidFill>
+                  <a:srgbClr val="000066"/>
+                </a:solidFill>
+                <a:latin typeface="微軟正黑體" pitchFamily="34" charset="-120"/>
+                <a:ea typeface="微軟正黑體" pitchFamily="34" charset="-120"/>
+              </a:rPr>
+              <a:t>主同在的恩典痕跡</a:t>
+            </a:r>
+            <a:endParaRPr lang="en-US" altLang="zh-TW" sz="5400" b="1" dirty="0">
               <a:solidFill>
                 <a:srgbClr val="000066"/>
               </a:solidFill>

</xml_diff>